<commit_message>
[FIX] figures for manuscript
</commit_message>
<xml_diff>
--- a/bep029_files_example.pptx
+++ b/bep029_files_example.pptx
@@ -2,13 +2,13 @@
 <file path=ppt/presentation.xml><?xml version="1.0" encoding="utf-8"?>
 <p:presentation xmlns:a="http://schemas.openxmlformats.org/drawingml/2006/main" xmlns:r="http://schemas.openxmlformats.org/officeDocument/2006/relationships" xmlns:p="http://schemas.openxmlformats.org/presentationml/2006/main" saveSubsetFonts="1">
   <p:sldMasterIdLst>
-    <p:sldMasterId id="2147483672" r:id="rId1"/>
+    <p:sldMasterId id="2147483684" r:id="rId1"/>
   </p:sldMasterIdLst>
   <p:sldIdLst>
     <p:sldId id="256" r:id="rId2"/>
     <p:sldId id="257" r:id="rId3"/>
   </p:sldIdLst>
-  <p:sldSz cx="28800425" cy="21599525"/>
+  <p:sldSz cx="38398450" cy="21599525"/>
   <p:notesSz cx="6858000" cy="9144000"/>
   <p:defaultTextStyle>
     <a:defPPr>
@@ -113,7 +113,7 @@
             <a:srgbClr val="A4A3A4"/>
           </p15:clr>
         </p15:guide>
-        <p15:guide id="2" pos="9071" userDrawn="1">
+        <p15:guide id="2" pos="12094" userDrawn="1">
           <p15:clr>
             <a:srgbClr val="A4A3A4"/>
           </p15:clr>
@@ -153,8 +153,8 @@
         </p:nvSpPr>
         <p:spPr>
           <a:xfrm>
-            <a:off x="2160032" y="3534924"/>
-            <a:ext cx="24480361" cy="7519835"/>
+            <a:off x="4799806" y="3534924"/>
+            <a:ext cx="28798838" cy="7519835"/>
           </a:xfrm>
         </p:spPr>
         <p:txBody>
@@ -185,8 +185,8 @@
         </p:nvSpPr>
         <p:spPr>
           <a:xfrm>
-            <a:off x="3600053" y="11344752"/>
-            <a:ext cx="21600319" cy="5214884"/>
+            <a:off x="4799806" y="11344752"/>
+            <a:ext cx="28798838" cy="5214884"/>
           </a:xfrm>
         </p:spPr>
         <p:txBody>
@@ -255,7 +255,7 @@
           <a:p>
             <a:fld id="{2EEE32F8-E73C-45E5-B32F-56C4E4163443}" type="datetimeFigureOut">
               <a:rPr lang="de-DE" smtClean="0"/>
-              <a:t>28.04.2023</a:t>
+              <a:t>05.05.2023</a:t>
             </a:fld>
             <a:endParaRPr lang="de-DE"/>
           </a:p>
@@ -306,7 +306,7 @@
     </p:spTree>
     <p:extLst>
       <p:ext uri="{BB962C8B-B14F-4D97-AF65-F5344CB8AC3E}">
-        <p14:creationId xmlns:p14="http://schemas.microsoft.com/office/powerpoint/2010/main" val="487812726"/>
+        <p14:creationId xmlns:p14="http://schemas.microsoft.com/office/powerpoint/2010/main" val="1304781601"/>
       </p:ext>
     </p:extLst>
   </p:cSld>
@@ -425,7 +425,7 @@
           <a:p>
             <a:fld id="{2EEE32F8-E73C-45E5-B32F-56C4E4163443}" type="datetimeFigureOut">
               <a:rPr lang="de-DE" smtClean="0"/>
-              <a:t>28.04.2023</a:t>
+              <a:t>05.05.2023</a:t>
             </a:fld>
             <a:endParaRPr lang="de-DE"/>
           </a:p>
@@ -476,7 +476,7 @@
     </p:spTree>
     <p:extLst>
       <p:ext uri="{BB962C8B-B14F-4D97-AF65-F5344CB8AC3E}">
-        <p14:creationId xmlns:p14="http://schemas.microsoft.com/office/powerpoint/2010/main" val="2591239705"/>
+        <p14:creationId xmlns:p14="http://schemas.microsoft.com/office/powerpoint/2010/main" val="2036302305"/>
       </p:ext>
     </p:extLst>
   </p:cSld>
@@ -515,8 +515,8 @@
         </p:nvSpPr>
         <p:spPr>
           <a:xfrm>
-            <a:off x="20610306" y="1149975"/>
-            <a:ext cx="6210092" cy="18304599"/>
+            <a:off x="27478891" y="1149975"/>
+            <a:ext cx="8279666" cy="18304599"/>
           </a:xfrm>
         </p:spPr>
         <p:txBody>
@@ -543,8 +543,8 @@
         </p:nvSpPr>
         <p:spPr>
           <a:xfrm>
-            <a:off x="1980031" y="1149975"/>
-            <a:ext cx="18270270" cy="18304599"/>
+            <a:off x="2639893" y="1149975"/>
+            <a:ext cx="24359017" cy="18304599"/>
           </a:xfrm>
         </p:spPr>
         <p:txBody>
@@ -605,7 +605,7 @@
           <a:p>
             <a:fld id="{2EEE32F8-E73C-45E5-B32F-56C4E4163443}" type="datetimeFigureOut">
               <a:rPr lang="de-DE" smtClean="0"/>
-              <a:t>28.04.2023</a:t>
+              <a:t>05.05.2023</a:t>
             </a:fld>
             <a:endParaRPr lang="de-DE"/>
           </a:p>
@@ -656,7 +656,7 @@
     </p:spTree>
     <p:extLst>
       <p:ext uri="{BB962C8B-B14F-4D97-AF65-F5344CB8AC3E}">
-        <p14:creationId xmlns:p14="http://schemas.microsoft.com/office/powerpoint/2010/main" val="3030174267"/>
+        <p14:creationId xmlns:p14="http://schemas.microsoft.com/office/powerpoint/2010/main" val="946087014"/>
       </p:ext>
     </p:extLst>
   </p:cSld>
@@ -775,7 +775,7 @@
           <a:p>
             <a:fld id="{2EEE32F8-E73C-45E5-B32F-56C4E4163443}" type="datetimeFigureOut">
               <a:rPr lang="de-DE" smtClean="0"/>
-              <a:t>28.04.2023</a:t>
+              <a:t>05.05.2023</a:t>
             </a:fld>
             <a:endParaRPr lang="de-DE"/>
           </a:p>
@@ -826,7 +826,7 @@
     </p:spTree>
     <p:extLst>
       <p:ext uri="{BB962C8B-B14F-4D97-AF65-F5344CB8AC3E}">
-        <p14:creationId xmlns:p14="http://schemas.microsoft.com/office/powerpoint/2010/main" val="3355004249"/>
+        <p14:creationId xmlns:p14="http://schemas.microsoft.com/office/powerpoint/2010/main" val="2799186405"/>
       </p:ext>
     </p:extLst>
   </p:cSld>
@@ -865,8 +865,8 @@
         </p:nvSpPr>
         <p:spPr>
           <a:xfrm>
-            <a:off x="1965030" y="5384888"/>
-            <a:ext cx="24840367" cy="8984801"/>
+            <a:off x="2619894" y="5384885"/>
+            <a:ext cx="33118663" cy="8984801"/>
           </a:xfrm>
         </p:spPr>
         <p:txBody>
@@ -897,8 +897,8 @@
         </p:nvSpPr>
         <p:spPr>
           <a:xfrm>
-            <a:off x="1965030" y="14454688"/>
-            <a:ext cx="24840367" cy="4724895"/>
+            <a:off x="2619894" y="14454685"/>
+            <a:ext cx="33118663" cy="4724895"/>
           </a:xfrm>
         </p:spPr>
         <p:txBody>
@@ -908,7 +908,9 @@
               <a:buNone/>
               <a:defRPr sz="7559">
                 <a:solidFill>
-                  <a:schemeClr val="tx1"/>
+                  <a:schemeClr val="tx1">
+                    <a:tint val="75000"/>
+                  </a:schemeClr>
                 </a:solidFill>
               </a:defRPr>
             </a:lvl1pPr>
@@ -1019,7 +1021,7 @@
           <a:p>
             <a:fld id="{2EEE32F8-E73C-45E5-B32F-56C4E4163443}" type="datetimeFigureOut">
               <a:rPr lang="de-DE" smtClean="0"/>
-              <a:t>28.04.2023</a:t>
+              <a:t>05.05.2023</a:t>
             </a:fld>
             <a:endParaRPr lang="de-DE"/>
           </a:p>
@@ -1070,7 +1072,7 @@
     </p:spTree>
     <p:extLst>
       <p:ext uri="{BB962C8B-B14F-4D97-AF65-F5344CB8AC3E}">
-        <p14:creationId xmlns:p14="http://schemas.microsoft.com/office/powerpoint/2010/main" val="2954121601"/>
+        <p14:creationId xmlns:p14="http://schemas.microsoft.com/office/powerpoint/2010/main" val="2953816316"/>
       </p:ext>
     </p:extLst>
   </p:cSld>
@@ -1132,8 +1134,8 @@
         </p:nvSpPr>
         <p:spPr>
           <a:xfrm>
-            <a:off x="1980029" y="5749874"/>
-            <a:ext cx="12240181" cy="13704700"/>
+            <a:off x="2639894" y="5749874"/>
+            <a:ext cx="16319341" cy="13704700"/>
           </a:xfrm>
         </p:spPr>
         <p:txBody>
@@ -1189,8 +1191,8 @@
         </p:nvSpPr>
         <p:spPr>
           <a:xfrm>
-            <a:off x="14580215" y="5749874"/>
-            <a:ext cx="12240181" cy="13704700"/>
+            <a:off x="19439215" y="5749874"/>
+            <a:ext cx="16319341" cy="13704700"/>
           </a:xfrm>
         </p:spPr>
         <p:txBody>
@@ -1251,7 +1253,7 @@
           <a:p>
             <a:fld id="{2EEE32F8-E73C-45E5-B32F-56C4E4163443}" type="datetimeFigureOut">
               <a:rPr lang="de-DE" smtClean="0"/>
-              <a:t>28.04.2023</a:t>
+              <a:t>05.05.2023</a:t>
             </a:fld>
             <a:endParaRPr lang="de-DE"/>
           </a:p>
@@ -1302,7 +1304,7 @@
     </p:spTree>
     <p:extLst>
       <p:ext uri="{BB962C8B-B14F-4D97-AF65-F5344CB8AC3E}">
-        <p14:creationId xmlns:p14="http://schemas.microsoft.com/office/powerpoint/2010/main" val="1814846246"/>
+        <p14:creationId xmlns:p14="http://schemas.microsoft.com/office/powerpoint/2010/main" val="2847652121"/>
       </p:ext>
     </p:extLst>
   </p:cSld>
@@ -1341,8 +1343,8 @@
         </p:nvSpPr>
         <p:spPr>
           <a:xfrm>
-            <a:off x="1983780" y="1149979"/>
-            <a:ext cx="24840367" cy="4174910"/>
+            <a:off x="2644895" y="1149976"/>
+            <a:ext cx="33118663" cy="4174910"/>
           </a:xfrm>
         </p:spPr>
         <p:txBody>
@@ -1369,8 +1371,8 @@
         </p:nvSpPr>
         <p:spPr>
           <a:xfrm>
-            <a:off x="1983784" y="5294885"/>
-            <a:ext cx="12183928" cy="2594941"/>
+            <a:off x="2644896" y="5294885"/>
+            <a:ext cx="16244343" cy="2594941"/>
           </a:xfrm>
         </p:spPr>
         <p:txBody>
@@ -1434,8 +1436,8 @@
         </p:nvSpPr>
         <p:spPr>
           <a:xfrm>
-            <a:off x="1983784" y="7889827"/>
-            <a:ext cx="12183928" cy="11604746"/>
+            <a:off x="2644896" y="7889827"/>
+            <a:ext cx="16244343" cy="11604746"/>
           </a:xfrm>
         </p:spPr>
         <p:txBody>
@@ -1491,8 +1493,8 @@
         </p:nvSpPr>
         <p:spPr>
           <a:xfrm>
-            <a:off x="14580217" y="5294885"/>
-            <a:ext cx="12243932" cy="2594941"/>
+            <a:off x="19439215" y="5294885"/>
+            <a:ext cx="16324343" cy="2594941"/>
           </a:xfrm>
         </p:spPr>
         <p:txBody>
@@ -1556,8 +1558,8 @@
         </p:nvSpPr>
         <p:spPr>
           <a:xfrm>
-            <a:off x="14580217" y="7889827"/>
-            <a:ext cx="12243932" cy="11604746"/>
+            <a:off x="19439215" y="7889827"/>
+            <a:ext cx="16324343" cy="11604746"/>
           </a:xfrm>
         </p:spPr>
         <p:txBody>
@@ -1618,7 +1620,7 @@
           <a:p>
             <a:fld id="{2EEE32F8-E73C-45E5-B32F-56C4E4163443}" type="datetimeFigureOut">
               <a:rPr lang="de-DE" smtClean="0"/>
-              <a:t>28.04.2023</a:t>
+              <a:t>05.05.2023</a:t>
             </a:fld>
             <a:endParaRPr lang="de-DE"/>
           </a:p>
@@ -1669,7 +1671,7 @@
     </p:spTree>
     <p:extLst>
       <p:ext uri="{BB962C8B-B14F-4D97-AF65-F5344CB8AC3E}">
-        <p14:creationId xmlns:p14="http://schemas.microsoft.com/office/powerpoint/2010/main" val="2284172250"/>
+        <p14:creationId xmlns:p14="http://schemas.microsoft.com/office/powerpoint/2010/main" val="3404437427"/>
       </p:ext>
     </p:extLst>
   </p:cSld>
@@ -1736,7 +1738,7 @@
           <a:p>
             <a:fld id="{2EEE32F8-E73C-45E5-B32F-56C4E4163443}" type="datetimeFigureOut">
               <a:rPr lang="de-DE" smtClean="0"/>
-              <a:t>28.04.2023</a:t>
+              <a:t>05.05.2023</a:t>
             </a:fld>
             <a:endParaRPr lang="de-DE"/>
           </a:p>
@@ -1787,7 +1789,7 @@
     </p:spTree>
     <p:extLst>
       <p:ext uri="{BB962C8B-B14F-4D97-AF65-F5344CB8AC3E}">
-        <p14:creationId xmlns:p14="http://schemas.microsoft.com/office/powerpoint/2010/main" val="284388793"/>
+        <p14:creationId xmlns:p14="http://schemas.microsoft.com/office/powerpoint/2010/main" val="127391042"/>
       </p:ext>
     </p:extLst>
   </p:cSld>
@@ -1831,7 +1833,7 @@
           <a:p>
             <a:fld id="{2EEE32F8-E73C-45E5-B32F-56C4E4163443}" type="datetimeFigureOut">
               <a:rPr lang="de-DE" smtClean="0"/>
-              <a:t>28.04.2023</a:t>
+              <a:t>05.05.2023</a:t>
             </a:fld>
             <a:endParaRPr lang="de-DE"/>
           </a:p>
@@ -1882,7 +1884,7 @@
     </p:spTree>
     <p:extLst>
       <p:ext uri="{BB962C8B-B14F-4D97-AF65-F5344CB8AC3E}">
-        <p14:creationId xmlns:p14="http://schemas.microsoft.com/office/powerpoint/2010/main" val="3706841"/>
+        <p14:creationId xmlns:p14="http://schemas.microsoft.com/office/powerpoint/2010/main" val="4024933272"/>
       </p:ext>
     </p:extLst>
   </p:cSld>
@@ -1921,8 +1923,8 @@
         </p:nvSpPr>
         <p:spPr>
           <a:xfrm>
-            <a:off x="1983780" y="1439968"/>
-            <a:ext cx="9288887" cy="5039889"/>
+            <a:off x="2644896" y="1439968"/>
+            <a:ext cx="12384499" cy="5039889"/>
           </a:xfrm>
         </p:spPr>
         <p:txBody>
@@ -1953,8 +1955,8 @@
         </p:nvSpPr>
         <p:spPr>
           <a:xfrm>
-            <a:off x="12243932" y="3109937"/>
-            <a:ext cx="14580215" cy="15349662"/>
+            <a:off x="16324343" y="3109933"/>
+            <a:ext cx="19439215" cy="15349662"/>
           </a:xfrm>
         </p:spPr>
         <p:txBody>
@@ -2038,8 +2040,8 @@
         </p:nvSpPr>
         <p:spPr>
           <a:xfrm>
-            <a:off x="1983780" y="6479857"/>
-            <a:ext cx="9288887" cy="12004738"/>
+            <a:off x="2644896" y="6479857"/>
+            <a:ext cx="12384499" cy="12004738"/>
           </a:xfrm>
         </p:spPr>
         <p:txBody>
@@ -2108,7 +2110,7 @@
           <a:p>
             <a:fld id="{2EEE32F8-E73C-45E5-B32F-56C4E4163443}" type="datetimeFigureOut">
               <a:rPr lang="de-DE" smtClean="0"/>
-              <a:t>28.04.2023</a:t>
+              <a:t>05.05.2023</a:t>
             </a:fld>
             <a:endParaRPr lang="de-DE"/>
           </a:p>
@@ -2159,7 +2161,7 @@
     </p:spTree>
     <p:extLst>
       <p:ext uri="{BB962C8B-B14F-4D97-AF65-F5344CB8AC3E}">
-        <p14:creationId xmlns:p14="http://schemas.microsoft.com/office/powerpoint/2010/main" val="1059222275"/>
+        <p14:creationId xmlns:p14="http://schemas.microsoft.com/office/powerpoint/2010/main" val="3016764352"/>
       </p:ext>
     </p:extLst>
   </p:cSld>
@@ -2198,8 +2200,8 @@
         </p:nvSpPr>
         <p:spPr>
           <a:xfrm>
-            <a:off x="1983780" y="1439968"/>
-            <a:ext cx="9288887" cy="5039889"/>
+            <a:off x="2644896" y="1439968"/>
+            <a:ext cx="12384499" cy="5039889"/>
           </a:xfrm>
         </p:spPr>
         <p:txBody>
@@ -2230,8 +2232,8 @@
         </p:nvSpPr>
         <p:spPr>
           <a:xfrm>
-            <a:off x="12243932" y="3109937"/>
-            <a:ext cx="14580215" cy="15349662"/>
+            <a:off x="16324343" y="3109933"/>
+            <a:ext cx="19439215" cy="15349662"/>
           </a:xfrm>
         </p:spPr>
         <p:txBody>
@@ -2295,8 +2297,8 @@
         </p:nvSpPr>
         <p:spPr>
           <a:xfrm>
-            <a:off x="1983780" y="6479857"/>
-            <a:ext cx="9288887" cy="12004738"/>
+            <a:off x="2644896" y="6479857"/>
+            <a:ext cx="12384499" cy="12004738"/>
           </a:xfrm>
         </p:spPr>
         <p:txBody>
@@ -2365,7 +2367,7 @@
           <a:p>
             <a:fld id="{2EEE32F8-E73C-45E5-B32F-56C4E4163443}" type="datetimeFigureOut">
               <a:rPr lang="de-DE" smtClean="0"/>
-              <a:t>28.04.2023</a:t>
+              <a:t>05.05.2023</a:t>
             </a:fld>
             <a:endParaRPr lang="de-DE"/>
           </a:p>
@@ -2416,7 +2418,7 @@
     </p:spTree>
     <p:extLst>
       <p:ext uri="{BB962C8B-B14F-4D97-AF65-F5344CB8AC3E}">
-        <p14:creationId xmlns:p14="http://schemas.microsoft.com/office/powerpoint/2010/main" val="2217601960"/>
+        <p14:creationId xmlns:p14="http://schemas.microsoft.com/office/powerpoint/2010/main" val="449496025"/>
       </p:ext>
     </p:extLst>
   </p:cSld>
@@ -2460,8 +2462,8 @@
         </p:nvSpPr>
         <p:spPr>
           <a:xfrm>
-            <a:off x="1980029" y="1149979"/>
-            <a:ext cx="24840367" cy="4174910"/>
+            <a:off x="2639894" y="1149976"/>
+            <a:ext cx="33118663" cy="4174910"/>
           </a:xfrm>
           <a:prstGeom prst="rect">
             <a:avLst/>
@@ -2493,8 +2495,8 @@
         </p:nvSpPr>
         <p:spPr>
           <a:xfrm>
-            <a:off x="1980029" y="5749874"/>
-            <a:ext cx="24840367" cy="13704700"/>
+            <a:off x="2639894" y="5749874"/>
+            <a:ext cx="33118663" cy="13704700"/>
           </a:xfrm>
           <a:prstGeom prst="rect">
             <a:avLst/>
@@ -2555,8 +2557,8 @@
         </p:nvSpPr>
         <p:spPr>
           <a:xfrm>
-            <a:off x="1980029" y="20019564"/>
-            <a:ext cx="6480096" cy="1149975"/>
+            <a:off x="2639894" y="20019561"/>
+            <a:ext cx="8639651" cy="1149975"/>
           </a:xfrm>
           <a:prstGeom prst="rect">
             <a:avLst/>
@@ -2578,7 +2580,7 @@
           <a:p>
             <a:fld id="{2EEE32F8-E73C-45E5-B32F-56C4E4163443}" type="datetimeFigureOut">
               <a:rPr lang="de-DE" smtClean="0"/>
-              <a:t>28.04.2023</a:t>
+              <a:t>05.05.2023</a:t>
             </a:fld>
             <a:endParaRPr lang="de-DE"/>
           </a:p>
@@ -2596,8 +2598,8 @@
         </p:nvSpPr>
         <p:spPr>
           <a:xfrm>
-            <a:off x="9540141" y="20019564"/>
-            <a:ext cx="9720143" cy="1149975"/>
+            <a:off x="12719487" y="20019561"/>
+            <a:ext cx="12959477" cy="1149975"/>
           </a:xfrm>
           <a:prstGeom prst="rect">
             <a:avLst/>
@@ -2633,8 +2635,8 @@
         </p:nvSpPr>
         <p:spPr>
           <a:xfrm>
-            <a:off x="20340300" y="20019564"/>
-            <a:ext cx="6480096" cy="1149975"/>
+            <a:off x="27118905" y="20019561"/>
+            <a:ext cx="8639651" cy="1149975"/>
           </a:xfrm>
           <a:prstGeom prst="rect">
             <a:avLst/>
@@ -2665,23 +2667,23 @@
     </p:spTree>
     <p:extLst>
       <p:ext uri="{BB962C8B-B14F-4D97-AF65-F5344CB8AC3E}">
-        <p14:creationId xmlns:p14="http://schemas.microsoft.com/office/powerpoint/2010/main" val="2362181802"/>
+        <p14:creationId xmlns:p14="http://schemas.microsoft.com/office/powerpoint/2010/main" val="3886372446"/>
       </p:ext>
     </p:extLst>
   </p:cSld>
   <p:clrMap bg1="lt1" tx1="dk1" bg2="lt2" tx2="dk2" accent1="accent1" accent2="accent2" accent3="accent3" accent4="accent4" accent5="accent5" accent6="accent6" hlink="hlink" folHlink="folHlink"/>
   <p:sldLayoutIdLst>
-    <p:sldLayoutId id="2147483673" r:id="rId1"/>
-    <p:sldLayoutId id="2147483674" r:id="rId2"/>
-    <p:sldLayoutId id="2147483675" r:id="rId3"/>
-    <p:sldLayoutId id="2147483676" r:id="rId4"/>
-    <p:sldLayoutId id="2147483677" r:id="rId5"/>
-    <p:sldLayoutId id="2147483678" r:id="rId6"/>
-    <p:sldLayoutId id="2147483679" r:id="rId7"/>
-    <p:sldLayoutId id="2147483680" r:id="rId8"/>
-    <p:sldLayoutId id="2147483681" r:id="rId9"/>
-    <p:sldLayoutId id="2147483682" r:id="rId10"/>
-    <p:sldLayoutId id="2147483683" r:id="rId11"/>
+    <p:sldLayoutId id="2147483685" r:id="rId1"/>
+    <p:sldLayoutId id="2147483686" r:id="rId2"/>
+    <p:sldLayoutId id="2147483687" r:id="rId3"/>
+    <p:sldLayoutId id="2147483688" r:id="rId4"/>
+    <p:sldLayoutId id="2147483689" r:id="rId5"/>
+    <p:sldLayoutId id="2147483690" r:id="rId6"/>
+    <p:sldLayoutId id="2147483691" r:id="rId7"/>
+    <p:sldLayoutId id="2147483692" r:id="rId8"/>
+    <p:sldLayoutId id="2147483693" r:id="rId9"/>
+    <p:sldLayoutId id="2147483694" r:id="rId10"/>
+    <p:sldLayoutId id="2147483695" r:id="rId11"/>
   </p:sldLayoutIdLst>
   <p:txStyles>
     <p:titleStyle>
@@ -2997,7 +2999,7 @@
         </p:nvSpPr>
         <p:spPr>
           <a:xfrm>
-            <a:off x="789511" y="5069605"/>
+            <a:off x="5588524" y="5069605"/>
             <a:ext cx="24422002" cy="9325630"/>
           </a:xfrm>
           <a:prstGeom prst="rect">
@@ -3511,7 +3513,7 @@
         </p:nvSpPr>
         <p:spPr>
           <a:xfrm>
-            <a:off x="5778537" y="4257133"/>
+            <a:off x="10577551" y="4257133"/>
             <a:ext cx="13096605" cy="3416320"/>
           </a:xfrm>
           <a:prstGeom prst="rect">
@@ -3600,7 +3602,7 @@
         </p:nvSpPr>
         <p:spPr>
           <a:xfrm>
-            <a:off x="19755920" y="4257134"/>
+            <a:off x="24554934" y="4257135"/>
             <a:ext cx="8254995" cy="7109639"/>
           </a:xfrm>
           <a:prstGeom prst="rect">
@@ -4407,7 +4409,7 @@
         </p:nvSpPr>
         <p:spPr>
           <a:xfrm>
-            <a:off x="15815420" y="13669415"/>
+            <a:off x="20614433" y="13669415"/>
             <a:ext cx="12195494" cy="3046988"/>
           </a:xfrm>
           <a:prstGeom prst="rect">
@@ -5004,7 +5006,7 @@
         </p:nvCxnSpPr>
         <p:spPr>
           <a:xfrm flipV="1">
-            <a:off x="14553399" y="8042788"/>
+            <a:off x="19352413" y="8042789"/>
             <a:ext cx="1780671" cy="1461817"/>
           </a:xfrm>
           <a:prstGeom prst="bentConnector3">
@@ -5050,7 +5052,7 @@
         </p:nvCxnSpPr>
         <p:spPr>
           <a:xfrm flipV="1">
-            <a:off x="14936809" y="8840462"/>
+            <a:off x="19735823" y="8840463"/>
             <a:ext cx="4819111" cy="1476615"/>
           </a:xfrm>
           <a:prstGeom prst="bentConnector3">
@@ -5096,7 +5098,7 @@
         </p:nvCxnSpPr>
         <p:spPr>
           <a:xfrm>
-            <a:off x="14936808" y="11114751"/>
+            <a:off x="19735821" y="11114752"/>
             <a:ext cx="4207840" cy="2554665"/>
           </a:xfrm>
           <a:prstGeom prst="bentConnector3">
@@ -5158,6 +5160,214 @@
       </p:grpSpPr>
       <p:sp>
         <p:nvSpPr>
+          <p:cNvPr id="1030" name="Rectangle 1029">
+            <a:extLst>
+              <a:ext uri="{FF2B5EF4-FFF2-40B4-BE49-F238E27FC236}">
+                <a16:creationId xmlns:a16="http://schemas.microsoft.com/office/drawing/2014/main" id="{0DA8E47B-EC44-C587-76D4-6000ABF1223C}"/>
+              </a:ext>
+            </a:extLst>
+          </p:cNvPr>
+          <p:cNvSpPr/>
+          <p:nvPr/>
+        </p:nvSpPr>
+        <p:spPr>
+          <a:xfrm>
+            <a:off x="17241099" y="635823"/>
+            <a:ext cx="184038" cy="3982887"/>
+          </a:xfrm>
+          <a:prstGeom prst="rect">
+            <a:avLst/>
+          </a:prstGeom>
+          <a:solidFill>
+            <a:srgbClr val="582766"/>
+          </a:solidFill>
+          <a:ln>
+            <a:noFill/>
+          </a:ln>
+        </p:spPr>
+        <p:style>
+          <a:lnRef idx="2">
+            <a:schemeClr val="accent1">
+              <a:shade val="50000"/>
+            </a:schemeClr>
+          </a:lnRef>
+          <a:fillRef idx="1">
+            <a:schemeClr val="accent1"/>
+          </a:fillRef>
+          <a:effectRef idx="0">
+            <a:schemeClr val="accent1"/>
+          </a:effectRef>
+          <a:fontRef idx="minor">
+            <a:schemeClr val="lt1"/>
+          </a:fontRef>
+        </p:style>
+        <p:txBody>
+          <a:bodyPr rtlCol="0" anchor="ctr"/>
+          <a:lstStyle/>
+          <a:p>
+            <a:pPr algn="ctr"/>
+            <a:endParaRPr lang="en-US"/>
+          </a:p>
+        </p:txBody>
+      </p:sp>
+      <p:sp>
+        <p:nvSpPr>
+          <p:cNvPr id="1031" name="Rectangle 1030">
+            <a:extLst>
+              <a:ext uri="{FF2B5EF4-FFF2-40B4-BE49-F238E27FC236}">
+                <a16:creationId xmlns:a16="http://schemas.microsoft.com/office/drawing/2014/main" id="{5F564318-8AC7-4FB5-C0EC-6816C80DEB81}"/>
+              </a:ext>
+            </a:extLst>
+          </p:cNvPr>
+          <p:cNvSpPr/>
+          <p:nvPr/>
+        </p:nvSpPr>
+        <p:spPr>
+          <a:xfrm>
+            <a:off x="24481406" y="4961423"/>
+            <a:ext cx="184036" cy="7445570"/>
+          </a:xfrm>
+          <a:prstGeom prst="rect">
+            <a:avLst/>
+          </a:prstGeom>
+          <a:solidFill>
+            <a:srgbClr val="7F2F70"/>
+          </a:solidFill>
+          <a:ln>
+            <a:noFill/>
+          </a:ln>
+        </p:spPr>
+        <p:style>
+          <a:lnRef idx="2">
+            <a:schemeClr val="accent1">
+              <a:shade val="50000"/>
+            </a:schemeClr>
+          </a:lnRef>
+          <a:fillRef idx="1">
+            <a:schemeClr val="accent1"/>
+          </a:fillRef>
+          <a:effectRef idx="0">
+            <a:schemeClr val="accent1"/>
+          </a:effectRef>
+          <a:fontRef idx="minor">
+            <a:schemeClr val="lt1"/>
+          </a:fontRef>
+        </p:style>
+        <p:txBody>
+          <a:bodyPr rtlCol="0" anchor="ctr"/>
+          <a:lstStyle/>
+          <a:p>
+            <a:pPr algn="ctr"/>
+            <a:endParaRPr lang="en-US"/>
+          </a:p>
+        </p:txBody>
+      </p:sp>
+      <p:sp>
+        <p:nvSpPr>
+          <p:cNvPr id="1033" name="Rectangle 1032">
+            <a:extLst>
+              <a:ext uri="{FF2B5EF4-FFF2-40B4-BE49-F238E27FC236}">
+                <a16:creationId xmlns:a16="http://schemas.microsoft.com/office/drawing/2014/main" id="{1AE93D26-889A-F8C5-F315-6B179F2D347F}"/>
+              </a:ext>
+            </a:extLst>
+          </p:cNvPr>
+          <p:cNvSpPr/>
+          <p:nvPr/>
+        </p:nvSpPr>
+        <p:spPr>
+          <a:xfrm>
+            <a:off x="24481404" y="13061691"/>
+            <a:ext cx="184038" cy="2699541"/>
+          </a:xfrm>
+          <a:prstGeom prst="rect">
+            <a:avLst/>
+          </a:prstGeom>
+          <a:solidFill>
+            <a:srgbClr val="DE5D5C"/>
+          </a:solidFill>
+          <a:ln>
+            <a:noFill/>
+          </a:ln>
+        </p:spPr>
+        <p:style>
+          <a:lnRef idx="2">
+            <a:schemeClr val="accent1">
+              <a:shade val="50000"/>
+            </a:schemeClr>
+          </a:lnRef>
+          <a:fillRef idx="1">
+            <a:schemeClr val="accent1"/>
+          </a:fillRef>
+          <a:effectRef idx="0">
+            <a:schemeClr val="accent1"/>
+          </a:effectRef>
+          <a:fontRef idx="minor">
+            <a:schemeClr val="lt1"/>
+          </a:fontRef>
+        </p:style>
+        <p:txBody>
+          <a:bodyPr rtlCol="0" anchor="ctr"/>
+          <a:lstStyle/>
+          <a:p>
+            <a:pPr algn="ctr"/>
+            <a:endParaRPr lang="en-US"/>
+          </a:p>
+        </p:txBody>
+      </p:sp>
+      <p:sp>
+        <p:nvSpPr>
+          <p:cNvPr id="1034" name="Rectangle 1033">
+            <a:extLst>
+              <a:ext uri="{FF2B5EF4-FFF2-40B4-BE49-F238E27FC236}">
+                <a16:creationId xmlns:a16="http://schemas.microsoft.com/office/drawing/2014/main" id="{1957B4B7-5AB8-652F-0B54-7FB805B05027}"/>
+              </a:ext>
+            </a:extLst>
+          </p:cNvPr>
+          <p:cNvSpPr/>
+          <p:nvPr/>
+        </p:nvSpPr>
+        <p:spPr>
+          <a:xfrm>
+            <a:off x="19240622" y="16274903"/>
+            <a:ext cx="184038" cy="3108543"/>
+          </a:xfrm>
+          <a:prstGeom prst="rect">
+            <a:avLst/>
+          </a:prstGeom>
+          <a:solidFill>
+            <a:srgbClr val="EDB081"/>
+          </a:solidFill>
+          <a:ln>
+            <a:noFill/>
+          </a:ln>
+        </p:spPr>
+        <p:style>
+          <a:lnRef idx="2">
+            <a:schemeClr val="accent1">
+              <a:shade val="50000"/>
+            </a:schemeClr>
+          </a:lnRef>
+          <a:fillRef idx="1">
+            <a:schemeClr val="accent1"/>
+          </a:fillRef>
+          <a:effectRef idx="0">
+            <a:schemeClr val="accent1"/>
+          </a:effectRef>
+          <a:fontRef idx="minor">
+            <a:schemeClr val="lt1"/>
+          </a:fontRef>
+        </p:style>
+        <p:txBody>
+          <a:bodyPr rtlCol="0" anchor="ctr"/>
+          <a:lstStyle/>
+          <a:p>
+            <a:pPr algn="ctr"/>
+            <a:endParaRPr lang="en-US"/>
+          </a:p>
+        </p:txBody>
+      </p:sp>
+      <p:sp>
+        <p:nvSpPr>
           <p:cNvPr id="91" name="Rectangle 90">
             <a:extLst>
               <a:ext uri="{FF2B5EF4-FFF2-40B4-BE49-F238E27FC236}">
@@ -5170,7 +5380,7 @@
         </p:nvSpPr>
         <p:spPr>
           <a:xfrm>
-            <a:off x="5953178" y="4968557"/>
+            <a:off x="10752191" y="4968558"/>
             <a:ext cx="13345892" cy="10734261"/>
           </a:xfrm>
           <a:prstGeom prst="rect">
@@ -5222,7 +5432,7 @@
         </p:nvSpPr>
         <p:spPr>
           <a:xfrm>
-            <a:off x="9581278" y="8674708"/>
+            <a:off x="14380292" y="8674708"/>
             <a:ext cx="9445133" cy="523220"/>
           </a:xfrm>
           <a:prstGeom prst="rect">
@@ -5307,7 +5517,7 @@
         </p:nvSpPr>
         <p:spPr>
           <a:xfrm>
-            <a:off x="12630592" y="648392"/>
+            <a:off x="17429605" y="648392"/>
             <a:ext cx="15495896" cy="3970318"/>
           </a:xfrm>
           <a:prstGeom prst="rect">
@@ -5398,7 +5608,7 @@
         </p:nvSpPr>
         <p:spPr>
           <a:xfrm>
-            <a:off x="19871493" y="4970308"/>
+            <a:off x="24670507" y="4970309"/>
             <a:ext cx="8254995" cy="7417415"/>
           </a:xfrm>
           <a:prstGeom prst="rect">
@@ -6135,7 +6345,7 @@
         </p:nvSpPr>
         <p:spPr>
           <a:xfrm>
-            <a:off x="14625647" y="16274902"/>
+            <a:off x="19424661" y="16274903"/>
             <a:ext cx="13500841" cy="3108543"/>
           </a:xfrm>
           <a:prstGeom prst="rect">
@@ -6300,7 +6510,7 @@
                   </a:schemeClr>
                 </a:solidFill>
               </a:rPr>
-              <a:t>imu1_lf_acc_x		ACCEL		m/s^2		222 	</a:t>
+              <a:t>imu1_rf_acc_x		ACCEL		m/s^2		222 	</a:t>
             </a:r>
             <a:r>
               <a:rPr lang="de-DE" sz="2800" dirty="0" err="1">
@@ -6311,7 +6521,7 @@
                   </a:schemeClr>
                 </a:solidFill>
               </a:rPr>
-              <a:t>lf</a:t>
+              <a:t>rf</a:t>
             </a:r>
             <a:r>
               <a:rPr lang="de-DE" sz="2800" dirty="0">
@@ -6333,7 +6543,7 @@
                   </a:schemeClr>
                 </a:solidFill>
               </a:rPr>
-              <a:t>left_foot</a:t>
+              <a:t>right_foot</a:t>
             </a:r>
             <a:r>
               <a:rPr lang="de-DE" sz="2800" dirty="0">
@@ -6357,7 +6567,7 @@
                   </a:schemeClr>
                 </a:solidFill>
               </a:rPr>
-              <a:t>imu1_lf_acc_y 		ACCEL 	m/s^2		222	</a:t>
+              <a:t>imu1_rf_acc_y 		ACCEL 	m/s^2		222	</a:t>
             </a:r>
             <a:r>
               <a:rPr lang="de-DE" sz="2800" dirty="0" err="1">
@@ -6368,7 +6578,7 @@
                   </a:schemeClr>
                 </a:solidFill>
               </a:rPr>
-              <a:t>lf</a:t>
+              <a:t>rf</a:t>
             </a:r>
             <a:r>
               <a:rPr lang="de-DE" sz="2800" dirty="0">
@@ -6390,7 +6600,29 @@
                   </a:schemeClr>
                 </a:solidFill>
               </a:rPr>
-              <a:t>left_foot</a:t>
+              <a:t>right</a:t>
+            </a:r>
+            <a:r>
+              <a:rPr lang="de-DE" sz="2800" dirty="0">
+                <a:solidFill>
+                  <a:schemeClr val="tx1">
+                    <a:lumMod val="75000"/>
+                    <a:lumOff val="25000"/>
+                  </a:schemeClr>
+                </a:solidFill>
+              </a:rPr>
+              <a:t> _</a:t>
+            </a:r>
+            <a:r>
+              <a:rPr lang="de-DE" sz="2800" dirty="0" err="1">
+                <a:solidFill>
+                  <a:schemeClr val="tx1">
+                    <a:lumMod val="75000"/>
+                    <a:lumOff val="25000"/>
+                  </a:schemeClr>
+                </a:solidFill>
+              </a:rPr>
+              <a:t>foot</a:t>
             </a:r>
             <a:r>
               <a:rPr lang="de-DE" sz="2800" dirty="0">
@@ -6414,7 +6646,7 @@
                   </a:schemeClr>
                 </a:solidFill>
               </a:rPr>
-              <a:t>imu1_lf_acc_z 		ACCEL  	m/s^2		222	</a:t>
+              <a:t>imu1_rf_acc_z 		ACCEL  	m/s^2		222	</a:t>
             </a:r>
             <a:r>
               <a:rPr lang="de-DE" sz="2800" dirty="0" err="1">
@@ -6425,7 +6657,7 @@
                   </a:schemeClr>
                 </a:solidFill>
               </a:rPr>
-              <a:t>lf</a:t>
+              <a:t>rf</a:t>
             </a:r>
             <a:r>
               <a:rPr lang="de-DE" sz="2800" dirty="0">
@@ -6447,7 +6679,29 @@
                   </a:schemeClr>
                 </a:solidFill>
               </a:rPr>
-              <a:t>left_foot</a:t>
+              <a:t>right</a:t>
+            </a:r>
+            <a:r>
+              <a:rPr lang="de-DE" sz="2800" dirty="0">
+                <a:solidFill>
+                  <a:schemeClr val="tx1">
+                    <a:lumMod val="75000"/>
+                    <a:lumOff val="25000"/>
+                  </a:schemeClr>
+                </a:solidFill>
+              </a:rPr>
+              <a:t> _</a:t>
+            </a:r>
+            <a:r>
+              <a:rPr lang="de-DE" sz="2800" dirty="0" err="1">
+                <a:solidFill>
+                  <a:schemeClr val="tx1">
+                    <a:lumMod val="75000"/>
+                    <a:lumOff val="25000"/>
+                  </a:schemeClr>
+                </a:solidFill>
+              </a:rPr>
+              <a:t>foot</a:t>
             </a:r>
             <a:r>
               <a:rPr lang="de-DE" sz="2800" dirty="0">
@@ -6471,7 +6725,7 @@
                   </a:schemeClr>
                 </a:solidFill>
               </a:rPr>
-              <a:t>imu1_lf_gyro_x		GYRO 		</a:t>
+              <a:t>imu1_rf_gyro_x		GYRO 		</a:t>
             </a:r>
             <a:r>
               <a:rPr lang="de-DE" sz="2800" dirty="0" err="1">
@@ -6504,7 +6758,7 @@
                   </a:schemeClr>
                 </a:solidFill>
               </a:rPr>
-              <a:t>lf</a:t>
+              <a:t>rf</a:t>
             </a:r>
             <a:r>
               <a:rPr lang="de-DE" sz="2800" dirty="0">
@@ -6526,7 +6780,29 @@
                   </a:schemeClr>
                 </a:solidFill>
               </a:rPr>
-              <a:t>left_foot</a:t>
+              <a:t>right</a:t>
+            </a:r>
+            <a:r>
+              <a:rPr lang="de-DE" sz="2800" dirty="0">
+                <a:solidFill>
+                  <a:schemeClr val="tx1">
+                    <a:lumMod val="75000"/>
+                    <a:lumOff val="25000"/>
+                  </a:schemeClr>
+                </a:solidFill>
+              </a:rPr>
+              <a:t> _</a:t>
+            </a:r>
+            <a:r>
+              <a:rPr lang="de-DE" sz="2800" dirty="0" err="1">
+                <a:solidFill>
+                  <a:schemeClr val="tx1">
+                    <a:lumMod val="75000"/>
+                    <a:lumOff val="25000"/>
+                  </a:schemeClr>
+                </a:solidFill>
+              </a:rPr>
+              <a:t>foot</a:t>
             </a:r>
             <a:r>
               <a:rPr lang="de-DE" sz="2800" dirty="0">
@@ -6550,7 +6826,7 @@
                   </a:schemeClr>
                 </a:solidFill>
               </a:rPr>
-              <a:t>imu1_lf_gyro_y 	GYRO 		</a:t>
+              <a:t>imu1_rf_gyro_y 	GYRO 		</a:t>
             </a:r>
             <a:r>
               <a:rPr lang="de-DE" sz="2800" dirty="0" err="1">
@@ -6583,7 +6859,7 @@
                   </a:schemeClr>
                 </a:solidFill>
               </a:rPr>
-              <a:t>lf</a:t>
+              <a:t>rf</a:t>
             </a:r>
             <a:r>
               <a:rPr lang="de-DE" sz="2800" dirty="0">
@@ -6605,7 +6881,29 @@
                   </a:schemeClr>
                 </a:solidFill>
               </a:rPr>
-              <a:t>left_foot</a:t>
+              <a:t>right</a:t>
+            </a:r>
+            <a:r>
+              <a:rPr lang="de-DE" sz="2800" dirty="0">
+                <a:solidFill>
+                  <a:schemeClr val="tx1">
+                    <a:lumMod val="75000"/>
+                    <a:lumOff val="25000"/>
+                  </a:schemeClr>
+                </a:solidFill>
+              </a:rPr>
+              <a:t> _</a:t>
+            </a:r>
+            <a:r>
+              <a:rPr lang="de-DE" sz="2800" dirty="0" err="1">
+                <a:solidFill>
+                  <a:schemeClr val="tx1">
+                    <a:lumMod val="75000"/>
+                    <a:lumOff val="25000"/>
+                  </a:schemeClr>
+                </a:solidFill>
+              </a:rPr>
+              <a:t>foot</a:t>
             </a:r>
             <a:r>
               <a:rPr lang="de-DE" sz="2800" dirty="0">
@@ -6629,7 +6927,7 @@
                   </a:schemeClr>
                 </a:solidFill>
               </a:rPr>
-              <a:t>imu1_lf_gyro_z 	GYRO		</a:t>
+              <a:t>imu1_rf_gyro_z 	GYRO		</a:t>
             </a:r>
             <a:r>
               <a:rPr lang="de-DE" sz="2800" dirty="0" err="1">
@@ -6662,7 +6960,7 @@
                   </a:schemeClr>
                 </a:solidFill>
               </a:rPr>
-              <a:t>lf</a:t>
+              <a:t>rf</a:t>
             </a:r>
             <a:r>
               <a:rPr lang="de-DE" sz="2800" dirty="0">
@@ -6684,7 +6982,29 @@
                   </a:schemeClr>
                 </a:solidFill>
               </a:rPr>
-              <a:t>left_foot</a:t>
+              <a:t>right</a:t>
+            </a:r>
+            <a:r>
+              <a:rPr lang="de-DE" sz="2800" dirty="0">
+                <a:solidFill>
+                  <a:schemeClr val="tx1">
+                    <a:lumMod val="75000"/>
+                    <a:lumOff val="25000"/>
+                  </a:schemeClr>
+                </a:solidFill>
+              </a:rPr>
+              <a:t> _</a:t>
+            </a:r>
+            <a:r>
+              <a:rPr lang="de-DE" sz="2800" dirty="0" err="1">
+                <a:solidFill>
+                  <a:schemeClr val="tx1">
+                    <a:lumMod val="75000"/>
+                    <a:lumOff val="25000"/>
+                  </a:schemeClr>
+                </a:solidFill>
+              </a:rPr>
+              <a:t>foot</a:t>
             </a:r>
             <a:r>
               <a:rPr lang="de-DE" sz="2800" dirty="0">
@@ -6714,7 +7034,7 @@
         </p:nvSpPr>
         <p:spPr>
           <a:xfrm>
-            <a:off x="9581278" y="9451146"/>
+            <a:off x="14380292" y="9451146"/>
             <a:ext cx="9445133" cy="523220"/>
           </a:xfrm>
           <a:prstGeom prst="rect">
@@ -6799,7 +7119,7 @@
         </p:nvSpPr>
         <p:spPr>
           <a:xfrm>
-            <a:off x="9581278" y="10223948"/>
+            <a:off x="14380292" y="10223948"/>
             <a:ext cx="9445133" cy="523220"/>
           </a:xfrm>
           <a:prstGeom prst="rect">
@@ -6884,7 +7204,7 @@
         </p:nvSpPr>
         <p:spPr>
           <a:xfrm>
-            <a:off x="9581278" y="10975142"/>
+            <a:off x="14380292" y="10975142"/>
             <a:ext cx="9445133" cy="523220"/>
           </a:xfrm>
           <a:prstGeom prst="rect">
@@ -6969,7 +7289,7 @@
         </p:nvSpPr>
         <p:spPr>
           <a:xfrm>
-            <a:off x="9581278" y="11692609"/>
+            <a:off x="14380292" y="11692609"/>
             <a:ext cx="9445133" cy="523220"/>
           </a:xfrm>
           <a:prstGeom prst="rect">
@@ -7054,7 +7374,7 @@
         </p:nvSpPr>
         <p:spPr>
           <a:xfrm>
-            <a:off x="8218295" y="8140354"/>
+            <a:off x="13017308" y="8140354"/>
             <a:ext cx="1362982" cy="523220"/>
           </a:xfrm>
           <a:prstGeom prst="rect">
@@ -7097,7 +7417,7 @@
         </p:nvSpPr>
         <p:spPr>
           <a:xfrm>
-            <a:off x="7028518" y="7647986"/>
+            <a:off x="11827531" y="7647986"/>
             <a:ext cx="1479666" cy="523220"/>
           </a:xfrm>
           <a:prstGeom prst="rect">
@@ -7140,7 +7460,7 @@
         </p:nvSpPr>
         <p:spPr>
           <a:xfrm>
-            <a:off x="7028518" y="7082780"/>
+            <a:off x="11827532" y="7082780"/>
             <a:ext cx="9445133" cy="523220"/>
           </a:xfrm>
           <a:prstGeom prst="rect">
@@ -7183,7 +7503,7 @@
         </p:nvSpPr>
         <p:spPr>
           <a:xfrm>
-            <a:off x="7028518" y="6531414"/>
+            <a:off x="11827532" y="6531414"/>
             <a:ext cx="9445133" cy="523220"/>
           </a:xfrm>
           <a:prstGeom prst="rect">
@@ -7226,7 +7546,7 @@
         </p:nvSpPr>
         <p:spPr>
           <a:xfrm>
-            <a:off x="7028518" y="5938061"/>
+            <a:off x="11827532" y="5938061"/>
             <a:ext cx="9445133" cy="523220"/>
           </a:xfrm>
           <a:prstGeom prst="rect">
@@ -7269,7 +7589,7 @@
         </p:nvSpPr>
         <p:spPr>
           <a:xfrm>
-            <a:off x="7028518" y="5370047"/>
+            <a:off x="11827532" y="5370047"/>
             <a:ext cx="9445133" cy="523220"/>
           </a:xfrm>
           <a:prstGeom prst="rect">
@@ -7312,7 +7632,7 @@
         </p:nvSpPr>
         <p:spPr>
           <a:xfrm>
-            <a:off x="9529687" y="14138910"/>
+            <a:off x="14328701" y="14138910"/>
             <a:ext cx="9445133" cy="523220"/>
           </a:xfrm>
           <a:prstGeom prst="rect">
@@ -7397,7 +7717,7 @@
         </p:nvSpPr>
         <p:spPr>
           <a:xfrm>
-            <a:off x="8218296" y="13618474"/>
+            <a:off x="13017310" y="13618474"/>
             <a:ext cx="1311391" cy="523220"/>
           </a:xfrm>
           <a:prstGeom prst="rect">
@@ -7440,7 +7760,7 @@
         </p:nvSpPr>
         <p:spPr>
           <a:xfrm>
-            <a:off x="7028518" y="13126107"/>
+            <a:off x="11827531" y="13126107"/>
             <a:ext cx="1479666" cy="523220"/>
           </a:xfrm>
           <a:prstGeom prst="rect">
@@ -7487,7 +7807,7 @@
         </p:nvCxnSpPr>
         <p:spPr>
           <a:xfrm rot="10800000" flipH="1" flipV="1">
-            <a:off x="7028517" y="5631657"/>
+            <a:off x="11827531" y="5631657"/>
             <a:ext cx="1" cy="7756060"/>
           </a:xfrm>
           <a:prstGeom prst="bentConnector3">
@@ -7535,7 +7855,7 @@
         </p:nvCxnSpPr>
         <p:spPr>
           <a:xfrm flipH="1">
-            <a:off x="6790905" y="6199671"/>
+            <a:off x="11589919" y="6199671"/>
             <a:ext cx="237613" cy="0"/>
           </a:xfrm>
           <a:prstGeom prst="line">
@@ -7579,7 +7899,7 @@
         </p:nvCxnSpPr>
         <p:spPr>
           <a:xfrm flipH="1">
-            <a:off x="6803605" y="6793024"/>
+            <a:off x="11602619" y="6793024"/>
             <a:ext cx="224913" cy="0"/>
           </a:xfrm>
           <a:prstGeom prst="line">
@@ -7623,7 +7943,7 @@
         </p:nvCxnSpPr>
         <p:spPr>
           <a:xfrm flipH="1">
-            <a:off x="6816305" y="7344390"/>
+            <a:off x="11615319" y="7344390"/>
             <a:ext cx="212213" cy="0"/>
           </a:xfrm>
           <a:prstGeom prst="line">
@@ -7667,7 +7987,7 @@
         </p:nvCxnSpPr>
         <p:spPr>
           <a:xfrm flipH="1">
-            <a:off x="6816304" y="7909596"/>
+            <a:off x="11615317" y="7909596"/>
             <a:ext cx="212214" cy="0"/>
           </a:xfrm>
           <a:prstGeom prst="line">
@@ -7712,7 +8032,7 @@
         </p:nvCxnSpPr>
         <p:spPr>
           <a:xfrm rot="16200000" flipH="1">
-            <a:off x="7877944" y="8061613"/>
+            <a:off x="12676957" y="8061613"/>
             <a:ext cx="230758" cy="449944"/>
           </a:xfrm>
           <a:prstGeom prst="bentConnector2">
@@ -7759,7 +8079,7 @@
         </p:nvCxnSpPr>
         <p:spPr>
           <a:xfrm rot="16200000" flipH="1">
-            <a:off x="7595210" y="9968151"/>
+            <a:off x="12394224" y="9968152"/>
             <a:ext cx="3290645" cy="681491"/>
           </a:xfrm>
           <a:prstGeom prst="bentConnector2">
@@ -7805,7 +8125,7 @@
         </p:nvCxnSpPr>
         <p:spPr>
           <a:xfrm flipH="1">
-            <a:off x="8899785" y="8936318"/>
+            <a:off x="13698798" y="8936318"/>
             <a:ext cx="681492" cy="0"/>
           </a:xfrm>
           <a:prstGeom prst="line">
@@ -7849,7 +8169,7 @@
         </p:nvCxnSpPr>
         <p:spPr>
           <a:xfrm flipH="1">
-            <a:off x="8899785" y="9712756"/>
+            <a:off x="13698798" y="9712756"/>
             <a:ext cx="681492" cy="8390"/>
           </a:xfrm>
           <a:prstGeom prst="line">
@@ -7893,7 +8213,7 @@
         </p:nvCxnSpPr>
         <p:spPr>
           <a:xfrm flipH="1">
-            <a:off x="8899785" y="10485558"/>
+            <a:off x="13698798" y="10485558"/>
             <a:ext cx="681492" cy="0"/>
           </a:xfrm>
           <a:prstGeom prst="line">
@@ -7937,7 +8257,7 @@
         </p:nvCxnSpPr>
         <p:spPr>
           <a:xfrm flipH="1" flipV="1">
-            <a:off x="8899785" y="11236490"/>
+            <a:off x="13698798" y="11236490"/>
             <a:ext cx="681492" cy="262"/>
           </a:xfrm>
           <a:prstGeom prst="line">
@@ -7982,7 +8302,7 @@
         </p:nvCxnSpPr>
         <p:spPr>
           <a:xfrm rot="16200000" flipH="1">
-            <a:off x="7877946" y="13539733"/>
+            <a:off x="12676960" y="13539733"/>
             <a:ext cx="230757" cy="449944"/>
           </a:xfrm>
           <a:prstGeom prst="bentConnector2">
@@ -8029,7 +8349,7 @@
         </p:nvCxnSpPr>
         <p:spPr>
           <a:xfrm rot="16200000" flipH="1">
-            <a:off x="8694016" y="14321670"/>
+            <a:off x="13493030" y="14321671"/>
             <a:ext cx="1015647" cy="655695"/>
           </a:xfrm>
           <a:prstGeom prst="bentConnector2">
@@ -8072,7 +8392,7 @@
         </p:nvSpPr>
         <p:spPr>
           <a:xfrm>
-            <a:off x="9529687" y="14895731"/>
+            <a:off x="14328701" y="14895731"/>
             <a:ext cx="9445133" cy="523220"/>
           </a:xfrm>
           <a:prstGeom prst="rect">
@@ -8118,7 +8438,7 @@
         </p:nvCxnSpPr>
         <p:spPr>
           <a:xfrm flipH="1">
-            <a:off x="8873990" y="14400520"/>
+            <a:off x="13673003" y="14400520"/>
             <a:ext cx="655696" cy="0"/>
           </a:xfrm>
           <a:prstGeom prst="line">
@@ -8173,7 +8493,7 @@
         </p:blipFill>
         <p:spPr>
           <a:xfrm>
-            <a:off x="2945065" y="5345698"/>
+            <a:off x="7744079" y="5345699"/>
             <a:ext cx="2284651" cy="2284651"/>
           </a:xfrm>
           <a:prstGeom prst="rect">
@@ -8202,7 +8522,7 @@
           </p:nvPr>
         </p:nvGraphicFramePr>
         <p:xfrm>
-          <a:off x="6241177" y="5631658"/>
+          <a:off x="11040191" y="5631659"/>
           <a:ext cx="311999" cy="1712733"/>
         </p:xfrm>
         <a:graphic>
@@ -8290,7 +8610,7 @@
         </p:nvGrpSpPr>
         <p:grpSpPr>
           <a:xfrm>
-            <a:off x="5157248" y="6461282"/>
+            <a:off x="9956262" y="6461283"/>
             <a:ext cx="1011461" cy="89821"/>
             <a:chOff x="2022891" y="5011992"/>
             <a:chExt cx="1011461" cy="89821"/>
@@ -8415,7 +8735,7 @@
           </p:nvPr>
         </p:nvGraphicFramePr>
         <p:xfrm>
-          <a:off x="8322872" y="8936318"/>
+          <a:off x="13121886" y="8936318"/>
           <a:ext cx="311999" cy="2300172"/>
         </p:xfrm>
         <a:graphic>
@@ -8503,7 +8823,7 @@
         </p:nvGrpSpPr>
         <p:grpSpPr>
           <a:xfrm>
-            <a:off x="5229715" y="10060824"/>
+            <a:off x="10028728" y="10060824"/>
             <a:ext cx="3035174" cy="89820"/>
             <a:chOff x="2022891" y="5011992"/>
             <a:chExt cx="1011461" cy="89821"/>
@@ -8621,7 +8941,7 @@
         </p:nvSpPr>
         <p:spPr>
           <a:xfrm>
-            <a:off x="6200507" y="11897268"/>
+            <a:off x="10999520" y="11897269"/>
             <a:ext cx="2342952" cy="101859"/>
           </a:xfrm>
           <a:prstGeom prst="rect">
@@ -8659,41 +8979,6 @@
           </a:p>
         </p:txBody>
       </p:sp>
-      <p:pic>
-        <p:nvPicPr>
-          <p:cNvPr id="115" name="Picture 114" descr="Chart, histogram&#10;&#10;Description automatically generated">
-            <a:extLst>
-              <a:ext uri="{FF2B5EF4-FFF2-40B4-BE49-F238E27FC236}">
-                <a16:creationId xmlns:a16="http://schemas.microsoft.com/office/drawing/2014/main" id="{90379D03-0BD8-D5E3-3A84-208E2EFB5B40}"/>
-              </a:ext>
-            </a:extLst>
-          </p:cNvPr>
-          <p:cNvPicPr>
-            <a:picLocks noChangeAspect="1"/>
-          </p:cNvPicPr>
-          <p:nvPr/>
-        </p:nvPicPr>
-        <p:blipFill rotWithShape="1">
-          <a:blip r:embed="rId3">
-            <a:extLst>
-              <a:ext uri="{28A0092B-C50C-407E-A947-70E740481C1C}">
-                <a14:useLocalDpi xmlns:a14="http://schemas.microsoft.com/office/drawing/2010/main" val="0"/>
-              </a:ext>
-            </a:extLst>
-          </a:blip>
-          <a:srcRect l="3272" t="9935" r="6089" b="4700"/>
-          <a:stretch/>
-        </p:blipFill>
-        <p:spPr>
-          <a:xfrm>
-            <a:off x="115796" y="7843149"/>
-            <a:ext cx="5052956" cy="4758946"/>
-          </a:xfrm>
-          <a:prstGeom prst="rect">
-            <a:avLst/>
-          </a:prstGeom>
-        </p:spPr>
-      </p:pic>
       <p:sp>
         <p:nvSpPr>
           <p:cNvPr id="116" name="Textfeld 7">
@@ -8708,7 +8993,7 @@
         </p:nvSpPr>
         <p:spPr>
           <a:xfrm>
-            <a:off x="19871493" y="13061692"/>
+            <a:off x="24670507" y="13061692"/>
             <a:ext cx="8229599" cy="2677656"/>
           </a:xfrm>
           <a:prstGeom prst="rect">
@@ -8971,7 +9256,7 @@
           <p:nvPr/>
         </p:nvPicPr>
         <p:blipFill>
-          <a:blip r:embed="rId4">
+          <a:blip r:embed="rId3">
             <a:extLst>
               <a:ext uri="{28A0092B-C50C-407E-A947-70E740481C1C}">
                 <a14:useLocalDpi xmlns:a14="http://schemas.microsoft.com/office/drawing/2010/main" val="0"/>
@@ -8984,7 +9269,7 @@
         </p:blipFill>
         <p:spPr>
           <a:xfrm>
-            <a:off x="2631267" y="13341029"/>
+            <a:off x="7430281" y="13341030"/>
             <a:ext cx="2118981" cy="2118981"/>
           </a:xfrm>
           <a:prstGeom prst="rect">
@@ -9006,7 +9291,7 @@
         </p:nvSpPr>
         <p:spPr>
           <a:xfrm>
-            <a:off x="3879305" y="15157341"/>
+            <a:off x="8678319" y="15157341"/>
             <a:ext cx="193209" cy="196368"/>
           </a:xfrm>
           <a:prstGeom prst="ellipse">
@@ -9060,7 +9345,7 @@
         </p:nvSpPr>
         <p:spPr>
           <a:xfrm>
-            <a:off x="18790782" y="8649569"/>
+            <a:off x="23589795" y="8649570"/>
             <a:ext cx="184038" cy="548359"/>
           </a:xfrm>
           <a:prstGeom prst="rect">
@@ -9112,7 +9397,7 @@
         </p:nvSpPr>
         <p:spPr>
           <a:xfrm>
-            <a:off x="18790782" y="9405368"/>
+            <a:off x="23589795" y="9405369"/>
             <a:ext cx="184038" cy="548359"/>
           </a:xfrm>
           <a:prstGeom prst="rect">
@@ -9164,7 +9449,7 @@
         </p:nvSpPr>
         <p:spPr>
           <a:xfrm>
-            <a:off x="18790782" y="10199983"/>
+            <a:off x="23589795" y="10199984"/>
             <a:ext cx="184038" cy="548359"/>
           </a:xfrm>
           <a:prstGeom prst="rect">
@@ -9216,7 +9501,7 @@
         </p:nvSpPr>
         <p:spPr>
           <a:xfrm>
-            <a:off x="18790782" y="11680039"/>
+            <a:off x="23589795" y="11680040"/>
             <a:ext cx="184038" cy="548359"/>
           </a:xfrm>
           <a:prstGeom prst="rect">
@@ -9256,214 +9541,6 @@
       </p:sp>
       <p:sp>
         <p:nvSpPr>
-          <p:cNvPr id="1030" name="Rectangle 1029">
-            <a:extLst>
-              <a:ext uri="{FF2B5EF4-FFF2-40B4-BE49-F238E27FC236}">
-                <a16:creationId xmlns:a16="http://schemas.microsoft.com/office/drawing/2014/main" id="{0DA8E47B-EC44-C587-76D4-6000ABF1223C}"/>
-              </a:ext>
-            </a:extLst>
-          </p:cNvPr>
-          <p:cNvSpPr/>
-          <p:nvPr/>
-        </p:nvSpPr>
-        <p:spPr>
-          <a:xfrm>
-            <a:off x="12442086" y="635823"/>
-            <a:ext cx="184038" cy="4005120"/>
-          </a:xfrm>
-          <a:prstGeom prst="rect">
-            <a:avLst/>
-          </a:prstGeom>
-          <a:solidFill>
-            <a:srgbClr val="582766"/>
-          </a:solidFill>
-          <a:ln>
-            <a:noFill/>
-          </a:ln>
-        </p:spPr>
-        <p:style>
-          <a:lnRef idx="2">
-            <a:schemeClr val="accent1">
-              <a:shade val="50000"/>
-            </a:schemeClr>
-          </a:lnRef>
-          <a:fillRef idx="1">
-            <a:schemeClr val="accent1"/>
-          </a:fillRef>
-          <a:effectRef idx="0">
-            <a:schemeClr val="accent1"/>
-          </a:effectRef>
-          <a:fontRef idx="minor">
-            <a:schemeClr val="lt1"/>
-          </a:fontRef>
-        </p:style>
-        <p:txBody>
-          <a:bodyPr rtlCol="0" anchor="ctr"/>
-          <a:lstStyle/>
-          <a:p>
-            <a:pPr algn="ctr"/>
-            <a:endParaRPr lang="en-US"/>
-          </a:p>
-        </p:txBody>
-      </p:sp>
-      <p:sp>
-        <p:nvSpPr>
-          <p:cNvPr id="1031" name="Rectangle 1030">
-            <a:extLst>
-              <a:ext uri="{FF2B5EF4-FFF2-40B4-BE49-F238E27FC236}">
-                <a16:creationId xmlns:a16="http://schemas.microsoft.com/office/drawing/2014/main" id="{5F564318-8AC7-4FB5-C0EC-6816C80DEB81}"/>
-              </a:ext>
-            </a:extLst>
-          </p:cNvPr>
-          <p:cNvSpPr/>
-          <p:nvPr/>
-        </p:nvSpPr>
-        <p:spPr>
-          <a:xfrm>
-            <a:off x="19682393" y="4961421"/>
-            <a:ext cx="184038" cy="7857189"/>
-          </a:xfrm>
-          <a:prstGeom prst="rect">
-            <a:avLst/>
-          </a:prstGeom>
-          <a:solidFill>
-            <a:srgbClr val="7F2F70"/>
-          </a:solidFill>
-          <a:ln>
-            <a:noFill/>
-          </a:ln>
-        </p:spPr>
-        <p:style>
-          <a:lnRef idx="2">
-            <a:schemeClr val="accent1">
-              <a:shade val="50000"/>
-            </a:schemeClr>
-          </a:lnRef>
-          <a:fillRef idx="1">
-            <a:schemeClr val="accent1"/>
-          </a:fillRef>
-          <a:effectRef idx="0">
-            <a:schemeClr val="accent1"/>
-          </a:effectRef>
-          <a:fontRef idx="minor">
-            <a:schemeClr val="lt1"/>
-          </a:fontRef>
-        </p:style>
-        <p:txBody>
-          <a:bodyPr rtlCol="0" anchor="ctr"/>
-          <a:lstStyle/>
-          <a:p>
-            <a:pPr algn="ctr"/>
-            <a:endParaRPr lang="en-US"/>
-          </a:p>
-        </p:txBody>
-      </p:sp>
-      <p:sp>
-        <p:nvSpPr>
-          <p:cNvPr id="1033" name="Rectangle 1032">
-            <a:extLst>
-              <a:ext uri="{FF2B5EF4-FFF2-40B4-BE49-F238E27FC236}">
-                <a16:creationId xmlns:a16="http://schemas.microsoft.com/office/drawing/2014/main" id="{1AE93D26-889A-F8C5-F315-6B179F2D347F}"/>
-              </a:ext>
-            </a:extLst>
-          </p:cNvPr>
-          <p:cNvSpPr/>
-          <p:nvPr/>
-        </p:nvSpPr>
-        <p:spPr>
-          <a:xfrm>
-            <a:off x="19682391" y="13039805"/>
-            <a:ext cx="184038" cy="2721428"/>
-          </a:xfrm>
-          <a:prstGeom prst="rect">
-            <a:avLst/>
-          </a:prstGeom>
-          <a:solidFill>
-            <a:srgbClr val="DE5D5C"/>
-          </a:solidFill>
-          <a:ln>
-            <a:noFill/>
-          </a:ln>
-        </p:spPr>
-        <p:style>
-          <a:lnRef idx="2">
-            <a:schemeClr val="accent1">
-              <a:shade val="50000"/>
-            </a:schemeClr>
-          </a:lnRef>
-          <a:fillRef idx="1">
-            <a:schemeClr val="accent1"/>
-          </a:fillRef>
-          <a:effectRef idx="0">
-            <a:schemeClr val="accent1"/>
-          </a:effectRef>
-          <a:fontRef idx="minor">
-            <a:schemeClr val="lt1"/>
-          </a:fontRef>
-        </p:style>
-        <p:txBody>
-          <a:bodyPr rtlCol="0" anchor="ctr"/>
-          <a:lstStyle/>
-          <a:p>
-            <a:pPr algn="ctr"/>
-            <a:endParaRPr lang="en-US"/>
-          </a:p>
-        </p:txBody>
-      </p:sp>
-      <p:sp>
-        <p:nvSpPr>
-          <p:cNvPr id="1034" name="Rectangle 1033">
-            <a:extLst>
-              <a:ext uri="{FF2B5EF4-FFF2-40B4-BE49-F238E27FC236}">
-                <a16:creationId xmlns:a16="http://schemas.microsoft.com/office/drawing/2014/main" id="{1957B4B7-5AB8-652F-0B54-7FB805B05027}"/>
-              </a:ext>
-            </a:extLst>
-          </p:cNvPr>
-          <p:cNvSpPr/>
-          <p:nvPr/>
-        </p:nvSpPr>
-        <p:spPr>
-          <a:xfrm>
-            <a:off x="14441609" y="16274902"/>
-            <a:ext cx="184038" cy="3134067"/>
-          </a:xfrm>
-          <a:prstGeom prst="rect">
-            <a:avLst/>
-          </a:prstGeom>
-          <a:solidFill>
-            <a:srgbClr val="EDB081"/>
-          </a:solidFill>
-          <a:ln>
-            <a:noFill/>
-          </a:ln>
-        </p:spPr>
-        <p:style>
-          <a:lnRef idx="2">
-            <a:schemeClr val="accent1">
-              <a:shade val="50000"/>
-            </a:schemeClr>
-          </a:lnRef>
-          <a:fillRef idx="1">
-            <a:schemeClr val="accent1"/>
-          </a:fillRef>
-          <a:effectRef idx="0">
-            <a:schemeClr val="accent1"/>
-          </a:effectRef>
-          <a:fontRef idx="minor">
-            <a:schemeClr val="lt1"/>
-          </a:fontRef>
-        </p:style>
-        <p:txBody>
-          <a:bodyPr rtlCol="0" anchor="ctr"/>
-          <a:lstStyle/>
-          <a:p>
-            <a:pPr algn="ctr"/>
-            <a:endParaRPr lang="en-US"/>
-          </a:p>
-        </p:txBody>
-      </p:sp>
-      <p:sp>
-        <p:nvSpPr>
           <p:cNvPr id="1037" name="Rectangle 1036">
             <a:extLst>
               <a:ext uri="{FF2B5EF4-FFF2-40B4-BE49-F238E27FC236}">
@@ -9476,7 +9553,7 @@
         </p:nvSpPr>
         <p:spPr>
           <a:xfrm>
-            <a:off x="4779170" y="14355317"/>
+            <a:off x="9578183" y="14355318"/>
             <a:ext cx="2342952" cy="101859"/>
           </a:xfrm>
           <a:prstGeom prst="rect">
@@ -9530,7 +9607,7 @@
         </p:nvCxnSpPr>
         <p:spPr>
           <a:xfrm flipV="1">
-            <a:off x="4750248" y="11954071"/>
+            <a:off x="9549262" y="11954071"/>
             <a:ext cx="3884623" cy="2446302"/>
           </a:xfrm>
           <a:prstGeom prst="bentConnector3">
@@ -9562,6 +9639,41 @@
           </a:fontRef>
         </p:style>
       </p:cxnSp>
+      <p:pic>
+        <p:nvPicPr>
+          <p:cNvPr id="9" name="Picture 8" descr="Chart&#10;&#10;Description automatically generated">
+            <a:extLst>
+              <a:ext uri="{FF2B5EF4-FFF2-40B4-BE49-F238E27FC236}">
+                <a16:creationId xmlns:a16="http://schemas.microsoft.com/office/drawing/2014/main" id="{406B2C83-2932-BD9B-71D6-C26B88895D6E}"/>
+              </a:ext>
+            </a:extLst>
+          </p:cNvPr>
+          <p:cNvPicPr>
+            <a:picLocks noChangeAspect="1"/>
+          </p:cNvPicPr>
+          <p:nvPr/>
+        </p:nvPicPr>
+        <p:blipFill rotWithShape="1">
+          <a:blip r:embed="rId4">
+            <a:extLst>
+              <a:ext uri="{28A0092B-C50C-407E-A947-70E740481C1C}">
+                <a14:useLocalDpi xmlns:a14="http://schemas.microsoft.com/office/drawing/2010/main" val="0"/>
+              </a:ext>
+            </a:extLst>
+          </a:blip>
+          <a:srcRect l="1648" t="9791" r="8247" b="1316"/>
+          <a:stretch/>
+        </p:blipFill>
+        <p:spPr>
+          <a:xfrm>
+            <a:off x="2992068" y="7706185"/>
+            <a:ext cx="7020531" cy="5448509"/>
+          </a:xfrm>
+          <a:prstGeom prst="rect">
+            <a:avLst/>
+          </a:prstGeom>
+        </p:spPr>
+      </p:pic>
     </p:spTree>
     <p:extLst>
       <p:ext uri="{BB962C8B-B14F-4D97-AF65-F5344CB8AC3E}">
@@ -9578,7 +9690,7 @@
 <file path=ppt/theme/theme1.xml><?xml version="1.0" encoding="utf-8"?>
 <a:theme xmlns:a="http://schemas.openxmlformats.org/drawingml/2006/main" name="Office Theme">
   <a:themeElements>
-    <a:clrScheme name="Benutzerdefiniert 2">
+    <a:clrScheme name="Office Theme">
       <a:dk1>
         <a:sysClr val="windowText" lastClr="000000"/>
       </a:dk1>
@@ -9592,22 +9704,22 @@
         <a:srgbClr val="E7E6E6"/>
       </a:lt2>
       <a:accent1>
-        <a:srgbClr val="FFBC67"/>
+        <a:srgbClr val="4472C4"/>
       </a:accent1>
       <a:accent2>
-        <a:srgbClr val="DA727E"/>
+        <a:srgbClr val="ED7D31"/>
       </a:accent2>
       <a:accent3>
-        <a:srgbClr val="AC6C82"/>
+        <a:srgbClr val="A5A5A5"/>
       </a:accent3>
       <a:accent4>
-        <a:srgbClr val="685C79"/>
+        <a:srgbClr val="FFC000"/>
       </a:accent4>
       <a:accent5>
-        <a:srgbClr val="455C7B"/>
+        <a:srgbClr val="5B9BD5"/>
       </a:accent5>
       <a:accent6>
-        <a:srgbClr val="46B29D"/>
+        <a:srgbClr val="70AD47"/>
       </a:accent6>
       <a:hlink>
         <a:srgbClr val="0563C1"/>

</xml_diff>